<commit_message>
Update DeveloperGuide and others
</commit_message>
<xml_diff>
--- a/docs/diagrams/AddLifeInsuranceSequenceDiagram.pptx
+++ b/docs/diagrams/AddLifeInsuranceSequenceDiagram.pptx
@@ -477,6 +477,90 @@
 </file>
 
 <file path=ppt/notesSlides/notesSlide1.xml><?xml version="1.0" encoding="utf-8"?>
+<p:notes xmlns:a="http://schemas.openxmlformats.org/drawingml/2006/main" xmlns:r="http://schemas.openxmlformats.org/officeDocument/2006/relationships" xmlns:p="http://schemas.openxmlformats.org/presentationml/2006/main">
+  <p:cSld>
+    <p:spTree>
+      <p:nvGrpSpPr>
+        <p:cNvPr id="1" name=""/>
+        <p:cNvGrpSpPr/>
+        <p:nvPr/>
+      </p:nvGrpSpPr>
+      <p:grpSpPr>
+        <a:xfrm>
+          <a:off x="0" y="0"/>
+          <a:ext cx="0" cy="0"/>
+          <a:chOff x="0" y="0"/>
+          <a:chExt cx="0" cy="0"/>
+        </a:xfrm>
+      </p:grpSpPr>
+      <p:sp>
+        <p:nvSpPr>
+          <p:cNvPr id="2" name="Slide Image Placeholder 1"/>
+          <p:cNvSpPr>
+            <a:spLocks noGrp="1" noRot="1" noChangeAspect="1"/>
+          </p:cNvSpPr>
+          <p:nvPr>
+            <p:ph type="sldImg"/>
+          </p:nvPr>
+        </p:nvSpPr>
+        <p:spPr/>
+      </p:sp>
+      <p:sp>
+        <p:nvSpPr>
+          <p:cNvPr id="3" name="Notes Placeholder 2"/>
+          <p:cNvSpPr>
+            <a:spLocks noGrp="1"/>
+          </p:cNvSpPr>
+          <p:nvPr>
+            <p:ph type="body" idx="1"/>
+          </p:nvPr>
+        </p:nvSpPr>
+        <p:spPr/>
+        <p:txBody>
+          <a:bodyPr/>
+          <a:lstStyle/>
+          <a:p>
+            <a:endParaRPr lang="en-US" dirty="0"/>
+          </a:p>
+        </p:txBody>
+      </p:sp>
+      <p:sp>
+        <p:nvSpPr>
+          <p:cNvPr id="4" name="Slide Number Placeholder 3"/>
+          <p:cNvSpPr>
+            <a:spLocks noGrp="1"/>
+          </p:cNvSpPr>
+          <p:nvPr>
+            <p:ph type="sldNum" sz="quarter" idx="10"/>
+          </p:nvPr>
+        </p:nvSpPr>
+        <p:spPr/>
+        <p:txBody>
+          <a:bodyPr/>
+          <a:lstStyle/>
+          <a:p>
+            <a:fld id="{5A7AB025-77E3-4BD1-A2FD-B3183DBA47A3}" type="slidenum">
+              <a:rPr lang="en-US" smtClean="0"/>
+              <a:t>1</a:t>
+            </a:fld>
+            <a:endParaRPr lang="en-US"/>
+          </a:p>
+        </p:txBody>
+      </p:sp>
+    </p:spTree>
+    <p:extLst>
+      <p:ext uri="{BB962C8B-B14F-4D97-AF65-F5344CB8AC3E}">
+        <p14:creationId xmlns:p14="http://schemas.microsoft.com/office/powerpoint/2010/main" val="7191386"/>
+      </p:ext>
+    </p:extLst>
+  </p:cSld>
+  <p:clrMapOvr>
+    <a:masterClrMapping/>
+  </p:clrMapOvr>
+</p:notes>
+</file>
+
+<file path=ppt/notesSlides/notesSlide2.xml><?xml version="1.0" encoding="utf-8"?>
 <p:notes xmlns:a="http://schemas.openxmlformats.org/drawingml/2006/main" xmlns:r="http://schemas.openxmlformats.org/officeDocument/2006/relationships" xmlns:p="http://schemas.openxmlformats.org/presentationml/2006/main">
   <p:cSld>
     <p:spTree>
@@ -3535,8 +3619,8 @@
         </p:nvSpPr>
         <p:spPr>
           <a:xfrm>
-            <a:off x="466573" y="-8217"/>
-            <a:ext cx="9125253" cy="7239000"/>
+            <a:off x="466573" y="-8218"/>
+            <a:ext cx="9125253" cy="9076018"/>
           </a:xfrm>
           <a:prstGeom prst="roundRect">
             <a:avLst>
@@ -3598,9 +3682,9 @@
           <p:nvPr/>
         </p:nvCxnSpPr>
         <p:spPr>
-          <a:xfrm>
-            <a:off x="1317049" y="1080233"/>
-            <a:ext cx="0" cy="5744757"/>
+          <a:xfrm flipH="1">
+            <a:off x="1318598" y="927833"/>
+            <a:ext cx="3424" cy="7878357"/>
           </a:xfrm>
           <a:prstGeom prst="line">
             <a:avLst/>
@@ -3712,8 +3796,8 @@
         </p:nvSpPr>
         <p:spPr>
           <a:xfrm>
-            <a:off x="1214127" y="1599028"/>
-            <a:ext cx="204760" cy="5030372"/>
+            <a:off x="1213852" y="1597759"/>
+            <a:ext cx="204760" cy="6990316"/>
           </a:xfrm>
           <a:prstGeom prst="rect">
             <a:avLst/>
@@ -3759,7 +3843,7 @@
         </p:nvSpPr>
         <p:spPr>
           <a:xfrm>
-            <a:off x="1248081" y="1620441"/>
+            <a:off x="1248081" y="3581400"/>
             <a:ext cx="1876119" cy="184666"/>
           </a:xfrm>
           <a:prstGeom prst="rect">
@@ -3812,7 +3896,7 @@
         </p:nvSpPr>
         <p:spPr>
           <a:xfrm>
-            <a:off x="94947" y="6337756"/>
+            <a:off x="94947" y="8305800"/>
             <a:ext cx="621216" cy="215444"/>
           </a:xfrm>
           <a:prstGeom prst="rect">
@@ -3852,7 +3936,7 @@
         </p:nvSpPr>
         <p:spPr>
           <a:xfrm>
-            <a:off x="4575399" y="1524000"/>
+            <a:off x="4576948" y="3505200"/>
             <a:ext cx="1590354" cy="461538"/>
           </a:xfrm>
           <a:prstGeom prst="rect">
@@ -3919,7 +4003,7 @@
         </p:nvSpPr>
         <p:spPr>
           <a:xfrm>
-            <a:off x="5168999" y="2362200"/>
+            <a:off x="5170548" y="4343400"/>
             <a:ext cx="157037" cy="3810000"/>
           </a:xfrm>
           <a:prstGeom prst="rect">
@@ -3966,7 +4050,7 @@
         </p:nvSpPr>
         <p:spPr>
           <a:xfrm>
-            <a:off x="2375120" y="1015765"/>
+            <a:off x="2404033" y="990600"/>
             <a:ext cx="1778201" cy="432035"/>
           </a:xfrm>
           <a:prstGeom prst="rect">
@@ -4036,7 +4120,7 @@
         </p:nvCxnSpPr>
         <p:spPr>
           <a:xfrm flipH="1">
-            <a:off x="3251113" y="1447800"/>
+            <a:off x="3280026" y="1422635"/>
             <a:ext cx="13108" cy="5377190"/>
           </a:xfrm>
           <a:prstGeom prst="line">
@@ -4073,8 +4157,8 @@
         </p:nvSpPr>
         <p:spPr>
           <a:xfrm>
-            <a:off x="3174913" y="1815109"/>
-            <a:ext cx="192475" cy="4661891"/>
+            <a:off x="3200786" y="3808832"/>
+            <a:ext cx="197148" cy="4649369"/>
           </a:xfrm>
           <a:prstGeom prst="rect">
             <a:avLst/>
@@ -4122,8 +4206,8 @@
         </p:nvCxnSpPr>
         <p:spPr>
           <a:xfrm>
-            <a:off x="1317049" y="1843059"/>
-            <a:ext cx="1857864" cy="0"/>
+            <a:off x="1447800" y="3808833"/>
+            <a:ext cx="1756026" cy="0"/>
           </a:xfrm>
           <a:prstGeom prst="straightConnector1">
             <a:avLst/>
@@ -4158,7 +4242,7 @@
         </p:nvSpPr>
         <p:spPr>
           <a:xfrm>
-            <a:off x="1187847" y="6824990"/>
+            <a:off x="1189396" y="8806190"/>
             <a:ext cx="258404" cy="261610"/>
           </a:xfrm>
           <a:prstGeom prst="rect">
@@ -4292,7 +4376,7 @@
         </p:nvCxnSpPr>
         <p:spPr>
           <a:xfrm>
-            <a:off x="234798" y="6609511"/>
+            <a:off x="234798" y="8577555"/>
             <a:ext cx="962730" cy="10520"/>
           </a:xfrm>
           <a:prstGeom prst="straightConnector1">
@@ -4338,7 +4422,7 @@
         </p:nvCxnSpPr>
         <p:spPr>
           <a:xfrm>
-            <a:off x="1446251" y="6477000"/>
+            <a:off x="1447800" y="8458200"/>
             <a:ext cx="1728662" cy="0"/>
           </a:xfrm>
           <a:prstGeom prst="straightConnector1">
@@ -4384,7 +4468,7 @@
         </p:nvCxnSpPr>
         <p:spPr>
           <a:xfrm>
-            <a:off x="5256092" y="1787171"/>
+            <a:off x="5257641" y="3768371"/>
             <a:ext cx="5107" cy="4918429"/>
           </a:xfrm>
           <a:prstGeom prst="line">
@@ -4421,7 +4505,7 @@
         </p:nvSpPr>
         <p:spPr>
           <a:xfrm>
-            <a:off x="3337391" y="2133600"/>
+            <a:off x="3338940" y="4114800"/>
             <a:ext cx="1768009" cy="184666"/>
           </a:xfrm>
           <a:prstGeom prst="rect">
@@ -4473,7 +4557,7 @@
         </p:nvSpPr>
         <p:spPr>
           <a:xfrm>
-            <a:off x="6327999" y="1676400"/>
+            <a:off x="6329548" y="3657600"/>
             <a:ext cx="1710542" cy="642449"/>
           </a:xfrm>
           <a:prstGeom prst="rect">
@@ -4545,7 +4629,7 @@
         </p:nvCxnSpPr>
         <p:spPr>
           <a:xfrm>
-            <a:off x="5339750" y="2819400"/>
+            <a:off x="5341299" y="4800600"/>
             <a:ext cx="1629726" cy="0"/>
           </a:xfrm>
           <a:prstGeom prst="straightConnector1">
@@ -4583,7 +4667,7 @@
         </p:nvCxnSpPr>
         <p:spPr>
           <a:xfrm flipH="1">
-            <a:off x="7090000" y="2318266"/>
+            <a:off x="7091549" y="4299466"/>
             <a:ext cx="1" cy="2406134"/>
           </a:xfrm>
           <a:prstGeom prst="line">
@@ -4620,7 +4704,7 @@
         </p:nvSpPr>
         <p:spPr>
           <a:xfrm>
-            <a:off x="6979402" y="2807920"/>
+            <a:off x="6980951" y="4789120"/>
             <a:ext cx="217409" cy="316280"/>
           </a:xfrm>
           <a:prstGeom prst="rect">
@@ -4669,7 +4753,7 @@
         </p:nvCxnSpPr>
         <p:spPr>
           <a:xfrm>
-            <a:off x="3264221" y="2362200"/>
+            <a:off x="3265770" y="4343400"/>
             <a:ext cx="1904778" cy="0"/>
           </a:xfrm>
           <a:prstGeom prst="straightConnector1">
@@ -4705,7 +4789,7 @@
         </p:nvSpPr>
         <p:spPr>
           <a:xfrm>
-            <a:off x="5247722" y="3611283"/>
+            <a:off x="5249271" y="5592483"/>
             <a:ext cx="196944" cy="2029070"/>
           </a:xfrm>
           <a:prstGeom prst="rect">
@@ -4752,7 +4836,7 @@
         </p:nvSpPr>
         <p:spPr>
           <a:xfrm>
-            <a:off x="5562600" y="3228201"/>
+            <a:off x="5564149" y="5209401"/>
             <a:ext cx="1503076" cy="276999"/>
           </a:xfrm>
           <a:prstGeom prst="rect">
@@ -4798,7 +4882,7 @@
         </p:nvSpPr>
         <p:spPr>
           <a:xfrm>
-            <a:off x="7442113" y="3953837"/>
+            <a:off x="7443662" y="5935037"/>
             <a:ext cx="1320887" cy="642449"/>
           </a:xfrm>
           <a:prstGeom prst="rect">
@@ -4868,7 +4952,7 @@
         </p:nvSpPr>
         <p:spPr>
           <a:xfrm>
-            <a:off x="5374211" y="3313850"/>
+            <a:off x="5375760" y="5295050"/>
             <a:ext cx="243780" cy="304062"/>
           </a:xfrm>
           <a:custGeom>
@@ -4953,7 +5037,7 @@
         </p:nvSpPr>
         <p:spPr>
           <a:xfrm rot="3114440">
-            <a:off x="5334158" y="5678046"/>
+            <a:off x="5335707" y="7659246"/>
             <a:ext cx="243780" cy="304062"/>
           </a:xfrm>
           <a:custGeom>
@@ -5038,7 +5122,7 @@
         </p:nvSpPr>
         <p:spPr>
           <a:xfrm>
-            <a:off x="5413599" y="2558534"/>
+            <a:off x="5415148" y="4539734"/>
             <a:ext cx="1401991" cy="184666"/>
           </a:xfrm>
           <a:prstGeom prst="rect">
@@ -5095,7 +5179,7 @@
         </p:nvCxnSpPr>
         <p:spPr>
           <a:xfrm>
-            <a:off x="5356714" y="3113411"/>
+            <a:off x="5358263" y="5094611"/>
             <a:ext cx="1685409" cy="0"/>
           </a:xfrm>
           <a:prstGeom prst="straightConnector1">
@@ -5133,7 +5217,7 @@
         </p:nvSpPr>
         <p:spPr>
           <a:xfrm>
-            <a:off x="6979402" y="4169729"/>
+            <a:off x="6980951" y="6150929"/>
             <a:ext cx="217409" cy="398389"/>
           </a:xfrm>
           <a:prstGeom prst="rect">
@@ -5182,7 +5266,7 @@
         </p:nvCxnSpPr>
         <p:spPr>
           <a:xfrm>
-            <a:off x="8062391" y="4568118"/>
+            <a:off x="8063940" y="6549318"/>
             <a:ext cx="0" cy="1724216"/>
           </a:xfrm>
           <a:prstGeom prst="line">
@@ -5219,8 +5303,8 @@
         </p:nvSpPr>
         <p:spPr>
           <a:xfrm>
-            <a:off x="7939834" y="5033789"/>
-            <a:ext cx="236409" cy="452611"/>
+            <a:off x="7941383" y="7014989"/>
+            <a:ext cx="236409" cy="406087"/>
           </a:xfrm>
           <a:prstGeom prst="rect">
             <a:avLst/>
@@ -5268,7 +5352,7 @@
         </p:nvCxnSpPr>
         <p:spPr>
           <a:xfrm>
-            <a:off x="5489799" y="4177844"/>
+            <a:off x="5491348" y="6159044"/>
             <a:ext cx="1479677" cy="0"/>
           </a:xfrm>
           <a:prstGeom prst="straightConnector1">
@@ -5304,7 +5388,7 @@
         </p:nvSpPr>
         <p:spPr>
           <a:xfrm>
-            <a:off x="5410200" y="3955045"/>
+            <a:off x="5411749" y="5936245"/>
             <a:ext cx="1600201" cy="184666"/>
           </a:xfrm>
           <a:prstGeom prst="rect">
@@ -5353,7 +5437,7 @@
         </p:nvCxnSpPr>
         <p:spPr>
           <a:xfrm>
-            <a:off x="5489799" y="4568118"/>
+            <a:off x="5491348" y="6549318"/>
             <a:ext cx="1479677" cy="0"/>
           </a:xfrm>
           <a:prstGeom prst="straightConnector1">
@@ -5393,7 +5477,7 @@
         </p:nvCxnSpPr>
         <p:spPr>
           <a:xfrm flipV="1">
-            <a:off x="5485187" y="5033789"/>
+            <a:off x="5486736" y="7014989"/>
             <a:ext cx="2454647" cy="15813"/>
           </a:xfrm>
           <a:prstGeom prst="straightConnector1">
@@ -5429,7 +5513,7 @@
         </p:nvSpPr>
         <p:spPr>
           <a:xfrm>
-            <a:off x="5881478" y="4849124"/>
+            <a:off x="5883027" y="6830324"/>
             <a:ext cx="1560636" cy="184666"/>
           </a:xfrm>
           <a:prstGeom prst="rect">
@@ -5478,7 +5562,7 @@
         </p:nvCxnSpPr>
         <p:spPr>
           <a:xfrm>
-            <a:off x="5485187" y="5439876"/>
+            <a:off x="5486736" y="7421076"/>
             <a:ext cx="2414126" cy="0"/>
           </a:xfrm>
           <a:prstGeom prst="straightConnector1">
@@ -5524,7 +5608,7 @@
         </p:nvCxnSpPr>
         <p:spPr>
           <a:xfrm>
-            <a:off x="3382737" y="6172200"/>
+            <a:off x="3384286" y="8153400"/>
             <a:ext cx="1786262" cy="0"/>
           </a:xfrm>
           <a:prstGeom prst="straightConnector1">
@@ -5554,6 +5638,479 @@
           </a:fontRef>
         </p:style>
       </p:cxnSp>
+      <p:sp>
+        <p:nvSpPr>
+          <p:cNvPr id="45" name="TextBox 44"/>
+          <p:cNvSpPr txBox="1"/>
+          <p:nvPr/>
+        </p:nvSpPr>
+        <p:spPr>
+          <a:xfrm>
+            <a:off x="1219200" y="1623379"/>
+            <a:ext cx="1876119" cy="184666"/>
+          </a:xfrm>
+          <a:prstGeom prst="rect">
+            <a:avLst/>
+          </a:prstGeom>
+          <a:noFill/>
+        </p:spPr>
+        <p:txBody>
+          <a:bodyPr wrap="square" lIns="0" tIns="0" rIns="0" bIns="0" rtlCol="0">
+            <a:spAutoFit/>
+          </a:bodyPr>
+          <a:lstStyle>
+            <a:defPPr>
+              <a:defRPr lang="en-US"/>
+            </a:defPPr>
+            <a:lvl1pPr algn="r">
+              <a:defRPr sz="1400">
+                <a:solidFill>
+                  <a:srgbClr val="0070C0"/>
+                </a:solidFill>
+              </a:defRPr>
+            </a:lvl1pPr>
+          </a:lstStyle>
+          <a:p>
+            <a:r>
+              <a:rPr lang="en-US" sz="1200" dirty="0" err="1"/>
+              <a:t>getFilteredPersonList</a:t>
+            </a:r>
+            <a:r>
+              <a:rPr lang="en-US" sz="1200" dirty="0"/>
+              <a:t>()</a:t>
+            </a:r>
+          </a:p>
+        </p:txBody>
+      </p:sp>
+      <p:cxnSp>
+        <p:nvCxnSpPr>
+          <p:cNvPr id="47" name="Straight Arrow Connector 46"/>
+          <p:cNvCxnSpPr>
+            <a:cxnSpLocks/>
+          </p:cNvCxnSpPr>
+          <p:nvPr/>
+        </p:nvCxnSpPr>
+        <p:spPr>
+          <a:xfrm>
+            <a:off x="1439588" y="1850812"/>
+            <a:ext cx="1756026" cy="0"/>
+          </a:xfrm>
+          <a:prstGeom prst="straightConnector1">
+            <a:avLst/>
+          </a:prstGeom>
+          <a:ln w="19050">
+            <a:solidFill>
+              <a:srgbClr val="0070C0"/>
+            </a:solidFill>
+            <a:tailEnd type="arrow"/>
+          </a:ln>
+        </p:spPr>
+        <p:style>
+          <a:lnRef idx="1">
+            <a:schemeClr val="accent1"/>
+          </a:lnRef>
+          <a:fillRef idx="0">
+            <a:schemeClr val="accent1"/>
+          </a:fillRef>
+          <a:effectRef idx="0">
+            <a:schemeClr val="accent1"/>
+          </a:effectRef>
+          <a:fontRef idx="minor">
+            <a:schemeClr val="tx1"/>
+          </a:fontRef>
+        </p:style>
+      </p:cxnSp>
+      <p:sp>
+        <p:nvSpPr>
+          <p:cNvPr id="48" name="Rectangle 47"/>
+          <p:cNvSpPr/>
+          <p:nvPr/>
+        </p:nvSpPr>
+        <p:spPr>
+          <a:xfrm>
+            <a:off x="3195613" y="1834947"/>
+            <a:ext cx="202321" cy="553124"/>
+          </a:xfrm>
+          <a:prstGeom prst="rect">
+            <a:avLst/>
+          </a:prstGeom>
+          <a:solidFill>
+            <a:srgbClr val="0070C0"/>
+          </a:solidFill>
+          <a:ln>
+            <a:solidFill>
+              <a:srgbClr val="0070C0"/>
+            </a:solidFill>
+          </a:ln>
+          <a:effectLst/>
+        </p:spPr>
+        <p:style>
+          <a:lnRef idx="1">
+            <a:schemeClr val="accent3"/>
+          </a:lnRef>
+          <a:fillRef idx="2">
+            <a:schemeClr val="accent3"/>
+          </a:fillRef>
+          <a:effectRef idx="1">
+            <a:schemeClr val="accent3"/>
+          </a:effectRef>
+          <a:fontRef idx="minor">
+            <a:schemeClr val="dk1"/>
+          </a:fontRef>
+        </p:style>
+        <p:txBody>
+          <a:bodyPr rtlCol="0" anchor="ctr"/>
+          <a:lstStyle/>
+          <a:p>
+            <a:pPr algn="ctr"/>
+            <a:endParaRPr lang="en-SG" sz="1400"/>
+          </a:p>
+        </p:txBody>
+      </p:sp>
+      <p:cxnSp>
+        <p:nvCxnSpPr>
+          <p:cNvPr id="56" name="Straight Arrow Connector 55">
+            <a:extLst>
+              <a:ext uri="{FF2B5EF4-FFF2-40B4-BE49-F238E27FC236}">
+                <a16:creationId xmlns:a16="http://schemas.microsoft.com/office/drawing/2014/main" xmlns="" id="{854D9FBB-2B36-4DC9-8B58-F7F177A8E586}"/>
+              </a:ext>
+            </a:extLst>
+          </p:cNvPr>
+          <p:cNvCxnSpPr>
+            <a:cxnSpLocks/>
+          </p:cNvCxnSpPr>
+          <p:nvPr/>
+        </p:nvCxnSpPr>
+        <p:spPr>
+          <a:xfrm>
+            <a:off x="1418887" y="2388071"/>
+            <a:ext cx="1728662" cy="0"/>
+          </a:xfrm>
+          <a:prstGeom prst="straightConnector1">
+            <a:avLst/>
+          </a:prstGeom>
+          <a:ln w="19050">
+            <a:solidFill>
+              <a:srgbClr val="0070C0"/>
+            </a:solidFill>
+            <a:prstDash val="sysDash"/>
+            <a:headEnd type="arrow" w="med" len="med"/>
+            <a:tailEnd type="none" w="med" len="med"/>
+          </a:ln>
+        </p:spPr>
+        <p:style>
+          <a:lnRef idx="1">
+            <a:schemeClr val="accent1"/>
+          </a:lnRef>
+          <a:fillRef idx="0">
+            <a:schemeClr val="accent1"/>
+          </a:fillRef>
+          <a:effectRef idx="0">
+            <a:schemeClr val="accent1"/>
+          </a:effectRef>
+          <a:fontRef idx="minor">
+            <a:schemeClr val="tx1"/>
+          </a:fontRef>
+        </p:style>
+      </p:cxnSp>
+      <p:sp>
+        <p:nvSpPr>
+          <p:cNvPr id="57" name="Rectangle 56"/>
+          <p:cNvSpPr/>
+          <p:nvPr/>
+        </p:nvSpPr>
+        <p:spPr>
+          <a:xfrm>
+            <a:off x="1347422" y="2786377"/>
+            <a:ext cx="186115" cy="417251"/>
+          </a:xfrm>
+          <a:prstGeom prst="rect">
+            <a:avLst/>
+          </a:prstGeom>
+          <a:solidFill>
+            <a:srgbClr val="C00000"/>
+          </a:solidFill>
+          <a:ln>
+            <a:solidFill>
+              <a:srgbClr val="0070C0"/>
+            </a:solidFill>
+          </a:ln>
+          <a:effectLst/>
+        </p:spPr>
+        <p:style>
+          <a:lnRef idx="1">
+            <a:schemeClr val="accent3"/>
+          </a:lnRef>
+          <a:fillRef idx="2">
+            <a:schemeClr val="accent3"/>
+          </a:fillRef>
+          <a:effectRef idx="1">
+            <a:schemeClr val="accent3"/>
+          </a:effectRef>
+          <a:fontRef idx="minor">
+            <a:schemeClr val="dk1"/>
+          </a:fontRef>
+        </p:style>
+        <p:txBody>
+          <a:bodyPr rtlCol="0" anchor="ctr"/>
+          <a:lstStyle/>
+          <a:p>
+            <a:pPr algn="ctr"/>
+            <a:endParaRPr lang="en-SG" sz="1400"/>
+          </a:p>
+        </p:txBody>
+      </p:sp>
+      <p:sp>
+        <p:nvSpPr>
+          <p:cNvPr id="59" name="Rectangle 58"/>
+          <p:cNvSpPr/>
+          <p:nvPr/>
+        </p:nvSpPr>
+        <p:spPr>
+          <a:xfrm>
+            <a:off x="1645455" y="2463890"/>
+            <a:ext cx="1519646" cy="461665"/>
+          </a:xfrm>
+          <a:prstGeom prst="rect">
+            <a:avLst/>
+          </a:prstGeom>
+        </p:spPr>
+        <p:txBody>
+          <a:bodyPr wrap="square">
+            <a:spAutoFit/>
+          </a:bodyPr>
+          <a:lstStyle/>
+          <a:p>
+            <a:pPr algn="ctr"/>
+            <a:r>
+              <a:rPr lang="en-US" sz="1200" dirty="0" err="1" smtClean="0">
+                <a:solidFill>
+                  <a:srgbClr val="C00000"/>
+                </a:solidFill>
+              </a:rPr>
+              <a:t>isAnyPersonInList</a:t>
+            </a:r>
+            <a:endParaRPr lang="en-US" sz="1200" dirty="0" smtClean="0">
+              <a:solidFill>
+                <a:srgbClr val="C00000"/>
+              </a:solidFill>
+            </a:endParaRPr>
+          </a:p>
+          <a:p>
+            <a:pPr algn="ctr"/>
+            <a:r>
+              <a:rPr lang="en-US" sz="1200" dirty="0" smtClean="0">
+                <a:solidFill>
+                  <a:srgbClr val="C00000"/>
+                </a:solidFill>
+              </a:rPr>
+              <a:t>(</a:t>
+            </a:r>
+            <a:r>
+              <a:rPr lang="en-US" sz="1200" dirty="0" err="1">
+                <a:solidFill>
+                  <a:srgbClr val="C00000"/>
+                </a:solidFill>
+              </a:rPr>
+              <a:t>personList</a:t>
+            </a:r>
+            <a:r>
+              <a:rPr lang="en-US" sz="1200" dirty="0">
+                <a:solidFill>
+                  <a:srgbClr val="C00000"/>
+                </a:solidFill>
+              </a:rPr>
+              <a:t>, </a:t>
+            </a:r>
+            <a:r>
+              <a:rPr lang="en-US" sz="1200" dirty="0" err="1">
+                <a:solidFill>
+                  <a:srgbClr val="C00000"/>
+                </a:solidFill>
+              </a:rPr>
+              <a:t>toAdd</a:t>
+            </a:r>
+            <a:r>
+              <a:rPr lang="en-US" sz="1200" dirty="0">
+                <a:solidFill>
+                  <a:srgbClr val="C00000"/>
+                </a:solidFill>
+              </a:rPr>
+              <a:t>)</a:t>
+            </a:r>
+          </a:p>
+        </p:txBody>
+      </p:sp>
+      <p:sp>
+        <p:nvSpPr>
+          <p:cNvPr id="60" name="Freeform 59"/>
+          <p:cNvSpPr/>
+          <p:nvPr/>
+        </p:nvSpPr>
+        <p:spPr>
+          <a:xfrm>
+            <a:off x="1473911" y="2488944"/>
+            <a:ext cx="243780" cy="304062"/>
+          </a:xfrm>
+          <a:custGeom>
+            <a:avLst/>
+            <a:gdLst>
+              <a:gd name="connsiteX0" fmla="*/ 0 w 465923"/>
+              <a:gd name="connsiteY0" fmla="*/ 63569 h 451987"/>
+              <a:gd name="connsiteX1" fmla="*/ 461246 w 465923"/>
+              <a:gd name="connsiteY1" fmla="*/ 31201 h 451987"/>
+              <a:gd name="connsiteX2" fmla="*/ 250853 w 465923"/>
+              <a:gd name="connsiteY2" fmla="*/ 451987 h 451987"/>
+            </a:gdLst>
+            <a:ahLst/>
+            <a:cxnLst>
+              <a:cxn ang="0">
+                <a:pos x="connsiteX0" y="connsiteY0"/>
+              </a:cxn>
+              <a:cxn ang="0">
+                <a:pos x="connsiteX1" y="connsiteY1"/>
+              </a:cxn>
+              <a:cxn ang="0">
+                <a:pos x="connsiteX2" y="connsiteY2"/>
+              </a:cxn>
+            </a:cxnLst>
+            <a:rect l="l" t="t" r="r" b="b"/>
+            <a:pathLst>
+              <a:path w="465923" h="451987">
+                <a:moveTo>
+                  <a:pt x="0" y="63569"/>
+                </a:moveTo>
+                <a:cubicBezTo>
+                  <a:pt x="209718" y="15017"/>
+                  <a:pt x="419437" y="-33535"/>
+                  <a:pt x="461246" y="31201"/>
+                </a:cubicBezTo>
+                <a:cubicBezTo>
+                  <a:pt x="503055" y="95937"/>
+                  <a:pt x="250853" y="451987"/>
+                  <a:pt x="250853" y="451987"/>
+                </a:cubicBezTo>
+              </a:path>
+            </a:pathLst>
+          </a:custGeom>
+          <a:noFill/>
+          <a:ln w="19050">
+            <a:solidFill>
+              <a:srgbClr val="C00000"/>
+            </a:solidFill>
+            <a:tailEnd type="arrow"/>
+          </a:ln>
+        </p:spPr>
+        <p:style>
+          <a:lnRef idx="2">
+            <a:schemeClr val="accent1">
+              <a:shade val="50000"/>
+            </a:schemeClr>
+          </a:lnRef>
+          <a:fillRef idx="1">
+            <a:schemeClr val="accent1"/>
+          </a:fillRef>
+          <a:effectRef idx="0">
+            <a:schemeClr val="accent1"/>
+          </a:effectRef>
+          <a:fontRef idx="minor">
+            <a:schemeClr val="lt1"/>
+          </a:fontRef>
+        </p:style>
+        <p:txBody>
+          <a:bodyPr rtlCol="0" anchor="ctr"/>
+          <a:lstStyle/>
+          <a:p>
+            <a:pPr algn="ctr"/>
+            <a:endParaRPr lang="en-US"/>
+          </a:p>
+        </p:txBody>
+      </p:sp>
+      <p:sp>
+        <p:nvSpPr>
+          <p:cNvPr id="61" name="Freeform 60"/>
+          <p:cNvSpPr/>
+          <p:nvPr/>
+        </p:nvSpPr>
+        <p:spPr>
+          <a:xfrm rot="3114440">
+            <a:off x="1450790" y="3256155"/>
+            <a:ext cx="243780" cy="304062"/>
+          </a:xfrm>
+          <a:custGeom>
+            <a:avLst/>
+            <a:gdLst>
+              <a:gd name="connsiteX0" fmla="*/ 0 w 465923"/>
+              <a:gd name="connsiteY0" fmla="*/ 63569 h 451987"/>
+              <a:gd name="connsiteX1" fmla="*/ 461246 w 465923"/>
+              <a:gd name="connsiteY1" fmla="*/ 31201 h 451987"/>
+              <a:gd name="connsiteX2" fmla="*/ 250853 w 465923"/>
+              <a:gd name="connsiteY2" fmla="*/ 451987 h 451987"/>
+            </a:gdLst>
+            <a:ahLst/>
+            <a:cxnLst>
+              <a:cxn ang="0">
+                <a:pos x="connsiteX0" y="connsiteY0"/>
+              </a:cxn>
+              <a:cxn ang="0">
+                <a:pos x="connsiteX1" y="connsiteY1"/>
+              </a:cxn>
+              <a:cxn ang="0">
+                <a:pos x="connsiteX2" y="connsiteY2"/>
+              </a:cxn>
+            </a:cxnLst>
+            <a:rect l="l" t="t" r="r" b="b"/>
+            <a:pathLst>
+              <a:path w="465923" h="451987">
+                <a:moveTo>
+                  <a:pt x="0" y="63569"/>
+                </a:moveTo>
+                <a:cubicBezTo>
+                  <a:pt x="209718" y="15017"/>
+                  <a:pt x="419437" y="-33535"/>
+                  <a:pt x="461246" y="31201"/>
+                </a:cubicBezTo>
+                <a:cubicBezTo>
+                  <a:pt x="503055" y="95937"/>
+                  <a:pt x="250853" y="451987"/>
+                  <a:pt x="250853" y="451987"/>
+                </a:cubicBezTo>
+              </a:path>
+            </a:pathLst>
+          </a:custGeom>
+          <a:noFill/>
+          <a:ln w="19050">
+            <a:solidFill>
+              <a:srgbClr val="C00000"/>
+            </a:solidFill>
+            <a:tailEnd type="arrow"/>
+          </a:ln>
+        </p:spPr>
+        <p:style>
+          <a:lnRef idx="2">
+            <a:schemeClr val="accent1">
+              <a:shade val="50000"/>
+            </a:schemeClr>
+          </a:lnRef>
+          <a:fillRef idx="1">
+            <a:schemeClr val="accent1"/>
+          </a:fillRef>
+          <a:effectRef idx="0">
+            <a:schemeClr val="accent1"/>
+          </a:effectRef>
+          <a:fontRef idx="minor">
+            <a:schemeClr val="lt1"/>
+          </a:fontRef>
+        </p:style>
+        <p:txBody>
+          <a:bodyPr rtlCol="0" anchor="ctr"/>
+          <a:lstStyle/>
+          <a:p>
+            <a:pPr algn="ctr"/>
+            <a:endParaRPr lang="en-US"/>
+          </a:p>
+        </p:txBody>
+      </p:sp>
     </p:spTree>
     <p:extLst>
       <p:ext uri="{BB962C8B-B14F-4D97-AF65-F5344CB8AC3E}">

</xml_diff>